<commit_message>
Updates on "18. Drawing Figures" slides
</commit_message>
<xml_diff>
--- a/Courses/Computer-Modeling-and-IT/Computer-Modeling-and-IT-5-Class/18-Drawing-Figures/18-Drawing-Figures.pptx
+++ b/Courses/Computer-Modeling-and-IT/Computer-Modeling-and-IT-5-Class/18-Drawing-Figures/18-Drawing-Figures.pptx
@@ -579,7 +579,7 @@
           <a:p>
             <a:fld id="{4E087215-0C8F-4762-A664-737A353EC9A4}" type="datetimeFigureOut">
               <a:rPr lang="bg-BG" smtClean="0"/>
-              <a:t>6.1.2024 г.</a:t>
+              <a:t>13.01.24 г.</a:t>
             </a:fld>
             <a:endParaRPr lang="bg-BG"/>
           </a:p>
@@ -756,7 +756,7 @@
           <a:p>
             <a:fld id="{72D84649-876A-46C9-8472-14CB09C070D8}" type="datetimeFigureOut">
               <a:rPr lang="en-US" smtClean="0"/>
-              <a:t>1/6/2024</a:t>
+              <a:t>1/13/24</a:t>
             </a:fld>
             <a:endParaRPr lang="en-US"/>
           </a:p>
@@ -3026,7 +3026,7 @@
             <a:fld id="{055373AC-9AA7-423B-BA00-BA1C74164DBD}" type="datetime1">
               <a:rPr lang="en-US" smtClean="0"/>
               <a:pPr/>
-              <a:t>1/6/2024</a:t>
+              <a:t>1/13/24</a:t>
             </a:fld>
             <a:endParaRPr lang="en-US" dirty="0"/>
           </a:p>
@@ -3705,7 +3705,7 @@
             <a:fld id="{055373AC-9AA7-423B-BA00-BA1C74164DBD}" type="datetime1">
               <a:rPr lang="en-US" smtClean="0"/>
               <a:pPr/>
-              <a:t>1/6/2024</a:t>
+              <a:t>1/13/24</a:t>
             </a:fld>
             <a:endParaRPr lang="en-US" dirty="0"/>
           </a:p>
@@ -4464,7 +4464,7 @@
             <a:fld id="{055373AC-9AA7-423B-BA00-BA1C74164DBD}" type="datetime1">
               <a:rPr lang="en-US" smtClean="0"/>
               <a:pPr/>
-              <a:t>1/6/2024</a:t>
+              <a:t>1/13/24</a:t>
             </a:fld>
             <a:endParaRPr lang="en-US" dirty="0"/>
           </a:p>
@@ -4959,7 +4959,7 @@
             <a:fld id="{055373AC-9AA7-423B-BA00-BA1C74164DBD}" type="datetime1">
               <a:rPr lang="en-US" smtClean="0"/>
               <a:pPr/>
-              <a:t>1/6/2024</a:t>
+              <a:t>1/13/24</a:t>
             </a:fld>
             <a:endParaRPr lang="en-US" dirty="0"/>
           </a:p>
@@ -7069,7 +7069,7 @@
             <a:fld id="{055373AC-9AA7-423B-BA00-BA1C74164DBD}" type="datetime1">
               <a:rPr lang="en-US" smtClean="0"/>
               <a:pPr/>
-              <a:t>1/6/2024</a:t>
+              <a:t>1/13/24</a:t>
             </a:fld>
             <a:endParaRPr lang="en-US" dirty="0"/>
           </a:p>
@@ -8408,7 +8408,7 @@
             <a:fld id="{055373AC-9AA7-423B-BA00-BA1C74164DBD}" type="datetime1">
               <a:rPr lang="en-US" smtClean="0"/>
               <a:pPr/>
-              <a:t>1/6/2024</a:t>
+              <a:t>1/13/24</a:t>
             </a:fld>
             <a:endParaRPr lang="en-US" dirty="0"/>
           </a:p>
@@ -9488,7 +9488,7 @@
             <a:fld id="{055373AC-9AA7-423B-BA00-BA1C74164DBD}" type="datetime1">
               <a:rPr lang="en-US" smtClean="0"/>
               <a:pPr/>
-              <a:t>1/6/2024</a:t>
+              <a:t>1/13/24</a:t>
             </a:fld>
             <a:endParaRPr lang="en-US" dirty="0"/>
           </a:p>
@@ -9900,7 +9900,7 @@
             <a:fld id="{055373AC-9AA7-423B-BA00-BA1C74164DBD}" type="datetime1">
               <a:rPr lang="en-US" smtClean="0"/>
               <a:pPr/>
-              <a:t>1/6/2024</a:t>
+              <a:t>1/13/24</a:t>
             </a:fld>
             <a:endParaRPr lang="en-US" dirty="0"/>
           </a:p>
@@ -10270,7 +10270,7 @@
             <a:fld id="{055373AC-9AA7-423B-BA00-BA1C74164DBD}" type="datetime1">
               <a:rPr lang="en-US" smtClean="0"/>
               <a:pPr/>
-              <a:t>1/6/2024</a:t>
+              <a:t>1/13/24</a:t>
             </a:fld>
             <a:endParaRPr lang="en-US" dirty="0"/>
           </a:p>
@@ -10938,7 +10938,7 @@
             <a:fld id="{055373AC-9AA7-423B-BA00-BA1C74164DBD}" type="datetime1">
               <a:rPr lang="en-US" smtClean="0"/>
               <a:pPr/>
-              <a:t>1/6/2024</a:t>
+              <a:t>1/13/24</a:t>
             </a:fld>
             <a:endParaRPr lang="en-US" dirty="0"/>
           </a:p>
@@ -11146,7 +11146,7 @@
             <a:fld id="{055373AC-9AA7-423B-BA00-BA1C74164DBD}" type="datetime1">
               <a:rPr lang="en-US" smtClean="0"/>
               <a:pPr/>
-              <a:t>1/6/2024</a:t>
+              <a:t>1/13/24</a:t>
             </a:fld>
             <a:endParaRPr lang="en-US" dirty="0"/>
           </a:p>
@@ -12198,8 +12198,8 @@
         </p:nvSpPr>
         <p:spPr>
           <a:xfrm>
-            <a:off x="5523262" y="2313309"/>
-            <a:ext cx="5037555" cy="587441"/>
+            <a:off x="5523261" y="2308709"/>
+            <a:ext cx="5710795" cy="648997"/>
           </a:xfrm>
           <a:prstGeom prst="rect">
             <a:avLst/>
@@ -12216,14 +12216,14 @@
           <a:lstStyle/>
           <a:p>
             <a:r>
-              <a:rPr lang="ru-RU" sz="2400" b="1" dirty="0"/>
+              <a:rPr lang="ru-RU" sz="2800" b="1" dirty="0"/>
               <a:t>Изтрива</a:t>
             </a:r>
             <a:r>
-              <a:rPr lang="ru-RU" sz="2400" dirty="0"/>
+              <a:rPr lang="ru-RU" sz="2800" dirty="0"/>
               <a:t> всички следи от молива</a:t>
             </a:r>
-            <a:endParaRPr lang="en-US" sz="2400" b="1" dirty="0"/>
+            <a:endParaRPr lang="en-US" sz="2800" b="1" dirty="0"/>
           </a:p>
         </p:txBody>
       </p:sp>
@@ -12235,8 +12235,8 @@
         </p:nvSpPr>
         <p:spPr>
           <a:xfrm>
-            <a:off x="5523262" y="3268402"/>
-            <a:ext cx="5037555" cy="1010314"/>
+            <a:off x="5523262" y="3117019"/>
+            <a:ext cx="5710795" cy="1142337"/>
           </a:xfrm>
           <a:prstGeom prst="rect">
             <a:avLst/>
@@ -12265,18 +12265,18 @@
               <a:buSzPct val="70000"/>
             </a:pPr>
             <a:r>
-              <a:rPr lang="bg-BG" sz="2400" dirty="0"/>
+              <a:rPr lang="bg-BG" sz="2800" dirty="0"/>
               <a:t>Пътят, който спрайтът изминава, </a:t>
             </a:r>
             <a:r>
-              <a:rPr lang="bg-BG" sz="2400" b="1" dirty="0"/>
+              <a:rPr lang="bg-BG" sz="2800" b="1" dirty="0"/>
               <a:t>ще се изчертава</a:t>
             </a:r>
             <a:r>
-              <a:rPr lang="bg-BG" sz="2400" dirty="0"/>
+              <a:rPr lang="bg-BG" sz="2800" dirty="0"/>
               <a:t> на сцената</a:t>
             </a:r>
-            <a:endParaRPr lang="en-US" sz="2400" dirty="0"/>
+            <a:endParaRPr lang="en-US" sz="2800" dirty="0"/>
           </a:p>
         </p:txBody>
       </p:sp>
@@ -12288,8 +12288,8 @@
         </p:nvSpPr>
         <p:spPr>
           <a:xfrm>
-            <a:off x="5523262" y="4561698"/>
-            <a:ext cx="5365934" cy="604049"/>
+            <a:off x="5523262" y="4366417"/>
+            <a:ext cx="5365934" cy="1142337"/>
           </a:xfrm>
           <a:prstGeom prst="rect">
             <a:avLst/>
@@ -12318,14 +12318,21 @@
               <a:buSzPct val="70000"/>
             </a:pPr>
             <a:r>
-              <a:rPr lang="bg-BG" sz="2400" b="1" dirty="0"/>
+              <a:rPr lang="bg-BG" sz="2800" b="1" dirty="0"/>
               <a:t>Спира изчертаването </a:t>
             </a:r>
             <a:r>
-              <a:rPr lang="bg-BG" sz="2400" dirty="0"/>
-              <a:t>на пътя на героя</a:t>
-            </a:r>
-            <a:endParaRPr lang="en-US" sz="2400" dirty="0"/>
+              <a:rPr lang="bg-BG" sz="2800" dirty="0"/>
+              <a:t>на пътя </a:t>
+            </a:r>
+            <a:br>
+              <a:rPr lang="bg-BG" sz="2800" dirty="0"/>
+            </a:br>
+            <a:r>
+              <a:rPr lang="bg-BG" sz="2800" dirty="0"/>
+              <a:t>на героя</a:t>
+            </a:r>
+            <a:endParaRPr lang="en-US" sz="2800" dirty="0"/>
           </a:p>
         </p:txBody>
       </p:sp>
@@ -12337,8 +12344,8 @@
         </p:nvSpPr>
         <p:spPr>
           <a:xfrm>
-            <a:off x="5523262" y="5681129"/>
-            <a:ext cx="5604426" cy="604049"/>
+            <a:off x="5523262" y="5498247"/>
+            <a:ext cx="5604426" cy="1142337"/>
           </a:xfrm>
           <a:prstGeom prst="rect">
             <a:avLst/>
@@ -12367,14 +12374,14 @@
               <a:buSzPct val="70000"/>
             </a:pPr>
             <a:r>
-              <a:rPr lang="bg-BG" sz="2400" b="1" dirty="0"/>
+              <a:rPr lang="bg-BG" sz="2800" b="1" dirty="0"/>
               <a:t>Задава се цвят </a:t>
             </a:r>
             <a:r>
-              <a:rPr lang="bg-BG" sz="2400" dirty="0"/>
+              <a:rPr lang="bg-BG" sz="2800" dirty="0"/>
               <a:t>на изчертаването на пътя</a:t>
             </a:r>
-            <a:endParaRPr lang="en-US" sz="2400" b="1" dirty="0"/>
+            <a:endParaRPr lang="en-US" sz="2800" b="1" dirty="0"/>
           </a:p>
         </p:txBody>
       </p:sp>
@@ -13733,13 +13740,6 @@
       <p:transition spd="slow" advClick="0" advTm="5000"/>
     </mc:Fallback>
   </mc:AlternateContent>
-  <p:timing>
-    <p:tnLst>
-      <p:par>
-        <p:cTn id="1" dur="indefinite" restart="never" nodeType="tmRoot"/>
-      </p:par>
-    </p:tnLst>
-  </p:timing>
 </p:sld>
 </file>
 
@@ -14188,8 +14188,8 @@
         </p:nvSpPr>
         <p:spPr bwMode="auto">
           <a:xfrm>
-            <a:off x="5093966" y="3021446"/>
-            <a:ext cx="2062969" cy="729344"/>
+            <a:off x="5093966" y="3034609"/>
+            <a:ext cx="2062969" cy="745341"/>
           </a:xfrm>
           <a:prstGeom prst="rect">
             <a:avLst/>
@@ -14439,72 +14439,6 @@
           <a:lstStyle/>
           <a:p>
             <a:pPr algn="ctr"/>
-            <a:r>
-              <a:rPr lang="bg-BG" sz="2800" b="1" dirty="0">
-                <a:solidFill>
-                  <a:srgbClr val="FFFFFF"/>
-                </a:solidFill>
-                <a:effectLst>
-                  <a:outerShdw blurRad="38100" dist="38100" dir="2700000" algn="tl">
-                    <a:srgbClr val="000000">
-                      <a:alpha val="43137"/>
-                    </a:srgbClr>
-                  </a:outerShdw>
-                </a:effectLst>
-              </a:rPr>
-              <a:t>Два блока се повтарят </a:t>
-            </a:r>
-            <a:r>
-              <a:rPr lang="bg-BG" sz="2800" b="1" dirty="0">
-                <a:solidFill>
-                  <a:schemeClr val="bg1">
-                    <a:lumMod val="60000"/>
-                    <a:lumOff val="40000"/>
-                  </a:schemeClr>
-                </a:solidFill>
-                <a:effectLst>
-                  <a:outerShdw blurRad="38100" dist="38100" dir="2700000" algn="tl">
-                    <a:srgbClr val="000000">
-                      <a:alpha val="43137"/>
-                    </a:srgbClr>
-                  </a:outerShdw>
-                </a:effectLst>
-              </a:rPr>
-              <a:t>няколко пъти</a:t>
-            </a:r>
-            <a:r>
-              <a:rPr lang="bg-BG" sz="2800" b="1" dirty="0">
-                <a:solidFill>
-                  <a:srgbClr val="FFFFFF"/>
-                </a:solidFill>
-                <a:effectLst>
-                  <a:outerShdw blurRad="38100" dist="38100" dir="2700000" algn="tl">
-                    <a:srgbClr val="000000">
-                      <a:alpha val="43137"/>
-                    </a:srgbClr>
-                  </a:outerShdw>
-                </a:effectLst>
-              </a:rPr>
-              <a:t>. За това можем да използваме </a:t>
-            </a:r>
-            <a:r>
-              <a:rPr lang="bg-BG" sz="2800" b="1" dirty="0">
-                <a:solidFill>
-                  <a:schemeClr val="bg1">
-                    <a:lumMod val="60000"/>
-                    <a:lumOff val="40000"/>
-                  </a:schemeClr>
-                </a:solidFill>
-                <a:effectLst>
-                  <a:outerShdw blurRad="38100" dist="38100" dir="2700000" algn="tl">
-                    <a:srgbClr val="000000">
-                      <a:alpha val="43137"/>
-                    </a:srgbClr>
-                  </a:outerShdw>
-                </a:effectLst>
-              </a:rPr>
-              <a:t>блок за повторения</a:t>
-            </a:r>
             <a:endParaRPr lang="en-US" sz="2800" b="1" dirty="0">
               <a:solidFill>
                 <a:schemeClr val="bg1">
@@ -14578,6 +14512,321 @@
             <a:endParaRPr lang="en-US" sz="2800" b="1" dirty="0">
               <a:solidFill>
                 <a:srgbClr val="FFFFFF"/>
+              </a:solidFill>
+              <a:effectLst>
+                <a:outerShdw blurRad="38100" dist="38100" dir="2700000" algn="tl">
+                  <a:srgbClr val="000000">
+                    <a:alpha val="43137"/>
+                  </a:srgbClr>
+                </a:outerShdw>
+              </a:effectLst>
+            </a:endParaRPr>
+          </a:p>
+        </p:txBody>
+      </p:sp>
+      <p:sp>
+        <p:nvSpPr>
+          <p:cNvPr id="6" name="Rounded Rectangular Callout 5">
+            <a:extLst>
+              <a:ext uri="{FF2B5EF4-FFF2-40B4-BE49-F238E27FC236}">
+                <a16:creationId xmlns:a16="http://schemas.microsoft.com/office/drawing/2014/main" id="{DDECDA55-769C-30D2-FCA2-A2DD1C07131F}"/>
+              </a:ext>
+            </a:extLst>
+          </p:cNvPr>
+          <p:cNvSpPr/>
+          <p:nvPr/>
+        </p:nvSpPr>
+        <p:spPr bwMode="auto">
+          <a:xfrm>
+            <a:off x="7633989" y="3715871"/>
+            <a:ext cx="4402747" cy="1951456"/>
+          </a:xfrm>
+          <a:prstGeom prst="wedgeRoundRectCallout">
+            <a:avLst>
+              <a:gd name="adj1" fmla="val -60392"/>
+              <a:gd name="adj2" fmla="val -22584"/>
+              <a:gd name="adj3" fmla="val 16667"/>
+            </a:avLst>
+          </a:prstGeom>
+          <a:solidFill>
+            <a:schemeClr val="dk2">
+              <a:alpha val="80000"/>
+            </a:schemeClr>
+          </a:solidFill>
+          <a:ln w="19050">
+            <a:solidFill>
+              <a:schemeClr val="tx1">
+                <a:lumMod val="75000"/>
+                <a:alpha val="80000"/>
+              </a:schemeClr>
+            </a:solidFill>
+          </a:ln>
+          <a:effectLst/>
+        </p:spPr>
+        <p:style>
+          <a:lnRef idx="2">
+            <a:schemeClr val="accent1">
+              <a:shade val="50000"/>
+            </a:schemeClr>
+          </a:lnRef>
+          <a:fillRef idx="1001">
+            <a:schemeClr val="dk2"/>
+          </a:fillRef>
+          <a:effectRef idx="0">
+            <a:schemeClr val="accent1"/>
+          </a:effectRef>
+          <a:fontRef idx="minor">
+            <a:schemeClr val="lt1"/>
+          </a:fontRef>
+        </p:style>
+        <p:txBody>
+          <a:bodyPr rot="0" spcFirstLastPara="0" vertOverflow="overflow" horzOverflow="overflow" vert="horz" wrap="square" lIns="91440" tIns="45720" rIns="91440" bIns="45720" numCol="1" spcCol="0" rtlCol="0" fromWordArt="0" anchor="ctr" anchorCtr="0" forceAA="0" compatLnSpc="1">
+            <a:prstTxWarp prst="textNoShape">
+              <a:avLst/>
+            </a:prstTxWarp>
+            <a:noAutofit/>
+          </a:bodyPr>
+          <a:lstStyle/>
+          <a:p>
+            <a:pPr algn="ctr"/>
+            <a:endParaRPr lang="en-US" sz="2800" b="1" dirty="0">
+              <a:solidFill>
+                <a:schemeClr val="bg1">
+                  <a:lumMod val="60000"/>
+                  <a:lumOff val="40000"/>
+                </a:schemeClr>
+              </a:solidFill>
+              <a:effectLst>
+                <a:outerShdw blurRad="38100" dist="38100" dir="2700000" algn="tl">
+                  <a:srgbClr val="000000">
+                    <a:alpha val="43137"/>
+                  </a:srgbClr>
+                </a:outerShdw>
+              </a:effectLst>
+            </a:endParaRPr>
+          </a:p>
+        </p:txBody>
+      </p:sp>
+      <p:sp>
+        <p:nvSpPr>
+          <p:cNvPr id="10" name="Rounded Rectangular Callout 9">
+            <a:extLst>
+              <a:ext uri="{FF2B5EF4-FFF2-40B4-BE49-F238E27FC236}">
+                <a16:creationId xmlns:a16="http://schemas.microsoft.com/office/drawing/2014/main" id="{D3225D5E-1549-C699-102E-61F75B0E1A4A}"/>
+              </a:ext>
+            </a:extLst>
+          </p:cNvPr>
+          <p:cNvSpPr/>
+          <p:nvPr/>
+        </p:nvSpPr>
+        <p:spPr bwMode="auto">
+          <a:xfrm>
+            <a:off x="7629470" y="3715871"/>
+            <a:ext cx="4402747" cy="1951456"/>
+          </a:xfrm>
+          <a:prstGeom prst="wedgeRoundRectCallout">
+            <a:avLst>
+              <a:gd name="adj1" fmla="val -59799"/>
+              <a:gd name="adj2" fmla="val 10886"/>
+              <a:gd name="adj3" fmla="val 16667"/>
+            </a:avLst>
+          </a:prstGeom>
+          <a:solidFill>
+            <a:schemeClr val="dk2">
+              <a:alpha val="80000"/>
+            </a:schemeClr>
+          </a:solidFill>
+          <a:ln w="19050">
+            <a:solidFill>
+              <a:schemeClr val="tx1">
+                <a:lumMod val="75000"/>
+                <a:alpha val="80000"/>
+              </a:schemeClr>
+            </a:solidFill>
+          </a:ln>
+          <a:effectLst/>
+        </p:spPr>
+        <p:style>
+          <a:lnRef idx="2">
+            <a:schemeClr val="accent1">
+              <a:shade val="50000"/>
+            </a:schemeClr>
+          </a:lnRef>
+          <a:fillRef idx="1001">
+            <a:schemeClr val="dk2"/>
+          </a:fillRef>
+          <a:effectRef idx="0">
+            <a:schemeClr val="accent1"/>
+          </a:effectRef>
+          <a:fontRef idx="minor">
+            <a:schemeClr val="lt1"/>
+          </a:fontRef>
+        </p:style>
+        <p:txBody>
+          <a:bodyPr rot="0" spcFirstLastPara="0" vertOverflow="overflow" horzOverflow="overflow" vert="horz" wrap="square" lIns="91440" tIns="45720" rIns="91440" bIns="45720" numCol="1" spcCol="0" rtlCol="0" fromWordArt="0" anchor="ctr" anchorCtr="0" forceAA="0" compatLnSpc="1">
+            <a:prstTxWarp prst="textNoShape">
+              <a:avLst/>
+            </a:prstTxWarp>
+            <a:noAutofit/>
+          </a:bodyPr>
+          <a:lstStyle/>
+          <a:p>
+            <a:pPr algn="ctr"/>
+            <a:endParaRPr lang="en-US" sz="2800" b="1" dirty="0">
+              <a:solidFill>
+                <a:schemeClr val="bg1">
+                  <a:lumMod val="60000"/>
+                  <a:lumOff val="40000"/>
+                </a:schemeClr>
+              </a:solidFill>
+              <a:effectLst>
+                <a:outerShdw blurRad="38100" dist="38100" dir="2700000" algn="tl">
+                  <a:srgbClr val="000000">
+                    <a:alpha val="43137"/>
+                  </a:srgbClr>
+                </a:outerShdw>
+              </a:effectLst>
+            </a:endParaRPr>
+          </a:p>
+        </p:txBody>
+      </p:sp>
+      <p:sp>
+        <p:nvSpPr>
+          <p:cNvPr id="13" name="Rounded Rectangular Callout 12">
+            <a:extLst>
+              <a:ext uri="{FF2B5EF4-FFF2-40B4-BE49-F238E27FC236}">
+                <a16:creationId xmlns:a16="http://schemas.microsoft.com/office/drawing/2014/main" id="{0356AD17-0DAC-612B-B49B-A5D0E9723134}"/>
+              </a:ext>
+            </a:extLst>
+          </p:cNvPr>
+          <p:cNvSpPr/>
+          <p:nvPr/>
+        </p:nvSpPr>
+        <p:spPr bwMode="auto">
+          <a:xfrm>
+            <a:off x="7624951" y="3715871"/>
+            <a:ext cx="4402747" cy="1951456"/>
+          </a:xfrm>
+          <a:prstGeom prst="wedgeRoundRectCallout">
+            <a:avLst>
+              <a:gd name="adj1" fmla="val -60096"/>
+              <a:gd name="adj2" fmla="val 53727"/>
+              <a:gd name="adj3" fmla="val 16667"/>
+            </a:avLst>
+          </a:prstGeom>
+          <a:solidFill>
+            <a:schemeClr val="dk2">
+              <a:alpha val="80000"/>
+            </a:schemeClr>
+          </a:solidFill>
+          <a:ln w="19050">
+            <a:solidFill>
+              <a:schemeClr val="tx1">
+                <a:lumMod val="75000"/>
+                <a:alpha val="80000"/>
+              </a:schemeClr>
+            </a:solidFill>
+          </a:ln>
+          <a:effectLst/>
+        </p:spPr>
+        <p:style>
+          <a:lnRef idx="2">
+            <a:schemeClr val="accent1">
+              <a:shade val="50000"/>
+            </a:schemeClr>
+          </a:lnRef>
+          <a:fillRef idx="1001">
+            <a:schemeClr val="dk2"/>
+          </a:fillRef>
+          <a:effectRef idx="0">
+            <a:schemeClr val="accent1"/>
+          </a:effectRef>
+          <a:fontRef idx="minor">
+            <a:schemeClr val="lt1"/>
+          </a:fontRef>
+        </p:style>
+        <p:txBody>
+          <a:bodyPr rot="0" spcFirstLastPara="0" vertOverflow="overflow" horzOverflow="overflow" vert="horz" wrap="square" lIns="91440" tIns="45720" rIns="91440" bIns="45720" numCol="1" spcCol="0" rtlCol="0" fromWordArt="0" anchor="ctr" anchorCtr="0" forceAA="0" compatLnSpc="1">
+            <a:prstTxWarp prst="textNoShape">
+              <a:avLst/>
+            </a:prstTxWarp>
+            <a:noAutofit/>
+          </a:bodyPr>
+          <a:lstStyle/>
+          <a:p>
+            <a:pPr algn="ctr"/>
+            <a:r>
+              <a:rPr lang="bg-BG" sz="2800" b="1" dirty="0">
+                <a:solidFill>
+                  <a:srgbClr val="FFFFFF"/>
+                </a:solidFill>
+                <a:effectLst>
+                  <a:outerShdw blurRad="38100" dist="38100" dir="2700000" algn="tl">
+                    <a:srgbClr val="000000">
+                      <a:alpha val="43137"/>
+                    </a:srgbClr>
+                  </a:outerShdw>
+                </a:effectLst>
+              </a:rPr>
+              <a:t>Два блока се повтарят </a:t>
+            </a:r>
+            <a:r>
+              <a:rPr lang="bg-BG" sz="2800" b="1" dirty="0">
+                <a:solidFill>
+                  <a:schemeClr val="bg1">
+                    <a:lumMod val="60000"/>
+                    <a:lumOff val="40000"/>
+                  </a:schemeClr>
+                </a:solidFill>
+                <a:effectLst>
+                  <a:outerShdw blurRad="38100" dist="38100" dir="2700000" algn="tl">
+                    <a:srgbClr val="000000">
+                      <a:alpha val="43137"/>
+                    </a:srgbClr>
+                  </a:outerShdw>
+                </a:effectLst>
+              </a:rPr>
+              <a:t>няколко пъти</a:t>
+            </a:r>
+            <a:r>
+              <a:rPr lang="bg-BG" sz="2800" b="1" dirty="0">
+                <a:solidFill>
+                  <a:srgbClr val="FFFFFF"/>
+                </a:solidFill>
+                <a:effectLst>
+                  <a:outerShdw blurRad="38100" dist="38100" dir="2700000" algn="tl">
+                    <a:srgbClr val="000000">
+                      <a:alpha val="43137"/>
+                    </a:srgbClr>
+                  </a:outerShdw>
+                </a:effectLst>
+              </a:rPr>
+              <a:t>. За това можем да използваме </a:t>
+            </a:r>
+            <a:r>
+              <a:rPr lang="bg-BG" sz="2800" b="1" dirty="0">
+                <a:solidFill>
+                  <a:schemeClr val="bg1">
+                    <a:lumMod val="60000"/>
+                    <a:lumOff val="40000"/>
+                  </a:schemeClr>
+                </a:solidFill>
+                <a:effectLst>
+                  <a:outerShdw blurRad="38100" dist="38100" dir="2700000" algn="tl">
+                    <a:srgbClr val="000000">
+                      <a:alpha val="43137"/>
+                    </a:srgbClr>
+                  </a:outerShdw>
+                </a:effectLst>
+              </a:rPr>
+              <a:t>блок за повторения</a:t>
+            </a:r>
+            <a:endParaRPr lang="en-US" sz="2800" b="1" dirty="0">
+              <a:solidFill>
+                <a:schemeClr val="bg1">
+                  <a:lumMod val="60000"/>
+                  <a:lumOff val="40000"/>
+                </a:schemeClr>
               </a:solidFill>
               <a:effectLst>
                 <a:outerShdw blurRad="38100" dist="38100" dir="2700000" algn="tl">
@@ -14849,7 +15098,7 @@
                                           </p:stCondLst>
                                         </p:cTn>
                                         <p:tgtEl>
-                                          <p:spTgt spid="17"/>
+                                          <p:spTgt spid="6"/>
                                         </p:tgtEl>
                                         <p:attrNameLst>
                                           <p:attrName>style.visibility</p:attrName>
@@ -14876,7 +15125,7 @@
                                           </p:stCondLst>
                                         </p:cTn>
                                         <p:tgtEl>
-                                          <p:spTgt spid="18"/>
+                                          <p:spTgt spid="10"/>
                                         </p:tgtEl>
                                         <p:attrNameLst>
                                           <p:attrName>style.visibility</p:attrName>
@@ -14903,6 +15152,87 @@
                                           </p:stCondLst>
                                         </p:cTn>
                                         <p:tgtEl>
+                                          <p:spTgt spid="13"/>
+                                        </p:tgtEl>
+                                        <p:attrNameLst>
+                                          <p:attrName>style.visibility</p:attrName>
+                                        </p:attrNameLst>
+                                      </p:cBhvr>
+                                      <p:to>
+                                        <p:strVal val="visible"/>
+                                      </p:to>
+                                    </p:set>
+                                  </p:childTnLst>
+                                </p:cTn>
+                              </p:par>
+                              <p:par>
+                                <p:cTn id="29" presetID="1" presetClass="entr" presetSubtype="0" fill="hold" grpId="0" nodeType="withEffect">
+                                  <p:stCondLst>
+                                    <p:cond delay="0"/>
+                                  </p:stCondLst>
+                                  <p:childTnLst>
+                                    <p:set>
+                                      <p:cBhvr>
+                                        <p:cTn id="30" dur="1" fill="hold">
+                                          <p:stCondLst>
+                                            <p:cond delay="0"/>
+                                          </p:stCondLst>
+                                        </p:cTn>
+                                        <p:tgtEl>
+                                          <p:spTgt spid="17"/>
+                                        </p:tgtEl>
+                                        <p:attrNameLst>
+                                          <p:attrName>style.visibility</p:attrName>
+                                        </p:attrNameLst>
+                                      </p:cBhvr>
+                                      <p:to>
+                                        <p:strVal val="visible"/>
+                                      </p:to>
+                                    </p:set>
+                                  </p:childTnLst>
+                                </p:cTn>
+                              </p:par>
+                              <p:par>
+                                <p:cTn id="31" presetID="1" presetClass="entr" presetSubtype="0" fill="hold" grpId="0" nodeType="withEffect">
+                                  <p:stCondLst>
+                                    <p:cond delay="0"/>
+                                  </p:stCondLst>
+                                  <p:childTnLst>
+                                    <p:set>
+                                      <p:cBhvr>
+                                        <p:cTn id="32" dur="1" fill="hold">
+                                          <p:stCondLst>
+                                            <p:cond delay="0"/>
+                                          </p:stCondLst>
+                                        </p:cTn>
+                                        <p:tgtEl>
+                                          <p:spTgt spid="18"/>
+                                        </p:tgtEl>
+                                        <p:attrNameLst>
+                                          <p:attrName>style.visibility</p:attrName>
+                                        </p:attrNameLst>
+                                      </p:cBhvr>
+                                      <p:to>
+                                        <p:strVal val="visible"/>
+                                      </p:to>
+                                    </p:set>
+                                  </p:childTnLst>
+                                </p:cTn>
+                              </p:par>
+                              <p:par>
+                                <p:cTn id="33" presetID="1" presetClass="entr" presetSubtype="0" fill="hold" grpId="0" nodeType="withEffect">
+                                  <p:stCondLst>
+                                    <p:cond delay="0"/>
+                                  </p:stCondLst>
+                                  <p:childTnLst>
+                                    <p:set>
+                                      <p:cBhvr>
+                                        <p:cTn id="34" dur="1" fill="hold">
+                                          <p:stCondLst>
+                                            <p:cond delay="0"/>
+                                          </p:stCondLst>
+                                        </p:cTn>
+                                        <p:tgtEl>
                                           <p:spTgt spid="15"/>
                                         </p:tgtEl>
                                         <p:attrNameLst>
@@ -14923,26 +15253,26 @@
                     </p:cTn>
                   </p:par>
                   <p:par>
-                    <p:cTn id="29" fill="hold">
+                    <p:cTn id="35" fill="hold">
                       <p:stCondLst>
                         <p:cond delay="indefinite"/>
                       </p:stCondLst>
                       <p:childTnLst>
                         <p:par>
-                          <p:cTn id="30" fill="hold">
+                          <p:cTn id="36" fill="hold">
                             <p:stCondLst>
                               <p:cond delay="0"/>
                             </p:stCondLst>
                             <p:childTnLst>
                               <p:par>
-                                <p:cTn id="31" presetID="1" presetClass="entr" presetSubtype="0" fill="hold" grpId="0" nodeType="clickEffect">
+                                <p:cTn id="37" presetID="1" presetClass="entr" presetSubtype="0" fill="hold" grpId="0" nodeType="clickEffect">
                                   <p:stCondLst>
                                     <p:cond delay="0"/>
                                   </p:stCondLst>
                                   <p:childTnLst>
                                     <p:set>
                                       <p:cBhvr>
-                                        <p:cTn id="32" dur="1" fill="hold">
+                                        <p:cTn id="38" dur="1" fill="hold">
                                           <p:stCondLst>
                                             <p:cond delay="0"/>
                                           </p:stCondLst>
@@ -14968,26 +15298,26 @@
                     </p:cTn>
                   </p:par>
                   <p:par>
-                    <p:cTn id="33" fill="hold">
+                    <p:cTn id="39" fill="hold">
                       <p:stCondLst>
                         <p:cond delay="indefinite"/>
                       </p:stCondLst>
                       <p:childTnLst>
                         <p:par>
-                          <p:cTn id="34" fill="hold">
+                          <p:cTn id="40" fill="hold">
                             <p:stCondLst>
                               <p:cond delay="0"/>
                             </p:stCondLst>
                             <p:childTnLst>
                               <p:par>
-                                <p:cTn id="35" presetID="1" presetClass="entr" presetSubtype="0" fill="hold" nodeType="clickEffect">
+                                <p:cTn id="41" presetID="1" presetClass="entr" presetSubtype="0" fill="hold" nodeType="clickEffect">
                                   <p:stCondLst>
                                     <p:cond delay="0"/>
                                   </p:stCondLst>
                                   <p:childTnLst>
                                     <p:set>
                                       <p:cBhvr>
-                                        <p:cTn id="36" dur="1" fill="hold">
+                                        <p:cTn id="42" dur="1" fill="hold">
                                           <p:stCondLst>
                                             <p:cond delay="0"/>
                                           </p:stCondLst>
@@ -15043,6 +15373,9 @@
       <p:bldP spid="18" grpId="0" animBg="1"/>
       <p:bldP spid="19" grpId="0" animBg="1"/>
       <p:bldP spid="15" grpId="0" animBg="1"/>
+      <p:bldP spid="6" grpId="0" animBg="1"/>
+      <p:bldP spid="10" grpId="0" animBg="1"/>
+      <p:bldP spid="13" grpId="0" animBg="1"/>
     </p:bldLst>
   </p:timing>
 </p:sld>
@@ -15082,7 +15415,15 @@
           <a:p>
             <a:r>
               <a:rPr lang="bg-BG" dirty="0"/>
-              <a:t>Чертаене на фигури - квадрат</a:t>
+              <a:t>Чертаене на фигури </a:t>
+            </a:r>
+            <a:r>
+              <a:rPr lang="en-US" dirty="0"/>
+              <a:t>–</a:t>
+            </a:r>
+            <a:r>
+              <a:rPr lang="bg-BG" dirty="0"/>
+              <a:t> квадрат</a:t>
             </a:r>
             <a:endParaRPr lang="en-US" dirty="0"/>
           </a:p>
@@ -15134,8 +15475,8 @@
         </p:blipFill>
         <p:spPr>
           <a:xfrm>
-            <a:off x="2894136" y="1563624"/>
-            <a:ext cx="6403728" cy="4987994"/>
+            <a:off x="2500794" y="1162594"/>
+            <a:ext cx="7311921" cy="5695405"/>
           </a:xfrm>
           <a:prstGeom prst="rect">
             <a:avLst/>
@@ -15160,13 +15501,6 @@
       <p:transition spd="slow" advClick="0" advTm="5000"/>
     </mc:Fallback>
   </mc:AlternateContent>
-  <p:timing>
-    <p:tnLst>
-      <p:par>
-        <p:cTn id="1" dur="indefinite" restart="never" nodeType="tmRoot"/>
-      </p:par>
-    </p:tnLst>
-  </p:timing>
 </p:sld>
 </file>
 
@@ -15787,7 +16121,7 @@
         <p:spPr>
           <a:xfrm>
             <a:off x="555258" y="1547936"/>
-            <a:ext cx="9476693" cy="3099310"/>
+            <a:ext cx="9476693" cy="3828036"/>
           </a:xfrm>
           <a:prstGeom prst="rect">
             <a:avLst/>
@@ -15816,7 +16150,7 @@
               <a:buChar char="§"/>
             </a:pPr>
             <a:r>
-              <a:rPr lang="bg-BG" sz="2900" b="1" dirty="0">
+              <a:rPr lang="bg-BG" sz="3400" b="1" dirty="0">
                 <a:solidFill>
                   <a:schemeClr val="bg1">
                     <a:lumMod val="60000"/>
@@ -15827,7 +16161,7 @@
               <a:t>Разширение</a:t>
             </a:r>
             <a:r>
-              <a:rPr lang="bg-BG" sz="2900" b="1" dirty="0">
+              <a:rPr lang="bg-BG" sz="3400" b="1" dirty="0">
                 <a:solidFill>
                   <a:schemeClr val="bg2"/>
                 </a:solidFill>
@@ -15835,7 +16169,7 @@
               <a:t> </a:t>
             </a:r>
             <a:r>
-              <a:rPr lang="bg-BG" sz="2900" dirty="0">
+              <a:rPr lang="bg-BG" sz="3400" dirty="0">
                 <a:solidFill>
                   <a:schemeClr val="bg2"/>
                 </a:solidFill>
@@ -15843,7 +16177,7 @@
               <a:t>–</a:t>
             </a:r>
             <a:r>
-              <a:rPr lang="en-US" sz="2900" dirty="0">
+              <a:rPr lang="en-US" sz="3400" dirty="0">
                 <a:solidFill>
                   <a:schemeClr val="bg2"/>
                 </a:solidFill>
@@ -15851,7 +16185,7 @@
               <a:t> </a:t>
             </a:r>
             <a:r>
-              <a:rPr lang="bg-BG" sz="2900" dirty="0">
+              <a:rPr lang="bg-BG" sz="3400" dirty="0">
                 <a:solidFill>
                   <a:schemeClr val="bg2"/>
                 </a:solidFill>
@@ -15859,13 +16193,42 @@
               <a:t>разширява </a:t>
             </a:r>
             <a:r>
-              <a:rPr lang="bg-BG" sz="2900" b="1" dirty="0">
+              <a:rPr lang="bg-BG" sz="3400" b="1" dirty="0">
                 <a:solidFill>
                   <a:schemeClr val="bg2"/>
                 </a:solidFill>
               </a:rPr>
               <a:t>функционалността</a:t>
             </a:r>
+            <a:r>
+              <a:rPr lang="en-US" sz="3400" b="1" dirty="0">
+                <a:solidFill>
+                  <a:schemeClr val="bg2"/>
+                </a:solidFill>
+              </a:rPr>
+              <a:t> </a:t>
+            </a:r>
+            <a:r>
+              <a:rPr lang="bg-BG" sz="3400" b="1" dirty="0">
+                <a:solidFill>
+                  <a:schemeClr val="bg2"/>
+                </a:solidFill>
+              </a:rPr>
+              <a:t>на </a:t>
+            </a:r>
+            <a:r>
+              <a:rPr lang="en-US" sz="3400" b="1" dirty="0">
+                <a:solidFill>
+                  <a:schemeClr val="bg2"/>
+                </a:solidFill>
+              </a:rPr>
+              <a:t>Scratch</a:t>
+            </a:r>
+            <a:endParaRPr lang="bg-BG" sz="3400" b="1" dirty="0">
+              <a:solidFill>
+                <a:schemeClr val="bg2"/>
+              </a:solidFill>
+            </a:endParaRPr>
           </a:p>
           <a:p>
             <a:pPr marL="456915" lvl="0" indent="-456915" defTabSz="1218438">
@@ -15885,7 +16248,7 @@
               <a:buChar char="§"/>
             </a:pPr>
             <a:r>
-              <a:rPr lang="bg-BG" sz="2900" b="1" dirty="0">
+              <a:rPr lang="bg-BG" sz="3400" b="1" dirty="0">
                 <a:solidFill>
                   <a:schemeClr val="bg1">
                     <a:lumMod val="60000"/>
@@ -15896,7 +16259,7 @@
               <a:t>Молив </a:t>
             </a:r>
             <a:r>
-              <a:rPr lang="bg-BG" sz="2900" dirty="0">
+              <a:rPr lang="bg-BG" sz="3400" dirty="0">
                 <a:solidFill>
                   <a:schemeClr val="bg2"/>
                 </a:solidFill>
@@ -15904,7 +16267,7 @@
               <a:t>– разширение за </a:t>
             </a:r>
             <a:r>
-              <a:rPr lang="bg-BG" sz="2900" b="1" dirty="0">
+              <a:rPr lang="bg-BG" sz="3400" b="1" dirty="0">
                 <a:solidFill>
                   <a:schemeClr val="bg2"/>
                 </a:solidFill>
@@ -15930,69 +16293,16 @@
               <a:buChar char="§"/>
             </a:pPr>
             <a:r>
-              <a:rPr lang="bg-BG" sz="3200" dirty="0">
+              <a:rPr lang="bg-BG" sz="3400" b="1" dirty="0">
                 <a:solidFill>
                   <a:schemeClr val="bg2"/>
                 </a:solidFill>
               </a:rPr>
-              <a:t>360/</a:t>
-            </a:r>
-            <a:r>
-              <a:rPr lang="en-US" sz="3200" dirty="0">
-                <a:solidFill>
-                  <a:schemeClr val="bg2"/>
-                </a:solidFill>
-              </a:rPr>
-              <a:t>n° (n </a:t>
-            </a:r>
-            <a:r>
-              <a:rPr lang="bg-BG" sz="3200" dirty="0">
-                <a:solidFill>
-                  <a:schemeClr val="bg2"/>
-                </a:solidFill>
-              </a:rPr>
-              <a:t>пъти)</a:t>
-            </a:r>
-            <a:r>
-              <a:rPr lang="en-US" sz="3200" dirty="0">
-                <a:solidFill>
-                  <a:schemeClr val="bg2"/>
-                </a:solidFill>
-              </a:rPr>
-              <a:t> </a:t>
-            </a:r>
-            <a:r>
-              <a:rPr lang="bg-BG" sz="3200" dirty="0">
-                <a:solidFill>
-                  <a:schemeClr val="bg2"/>
-                </a:solidFill>
-              </a:rPr>
-              <a:t>за създаване на </a:t>
-            </a:r>
-            <a:r>
-              <a:rPr lang="en-US" sz="3200" dirty="0">
-                <a:solidFill>
-                  <a:schemeClr val="bg2"/>
-                </a:solidFill>
-              </a:rPr>
-              <a:t>n-</a:t>
-            </a:r>
-            <a:r>
-              <a:rPr lang="bg-BG" sz="3200" dirty="0">
-                <a:solidFill>
-                  <a:schemeClr val="bg2"/>
-                </a:solidFill>
-              </a:rPr>
-              <a:t>ъгълник</a:t>
-            </a:r>
-            <a:endParaRPr lang="en-US" sz="3200" dirty="0">
-              <a:solidFill>
-                <a:schemeClr val="bg2"/>
-              </a:solidFill>
-            </a:endParaRPr>
-          </a:p>
-          <a:p>
-            <a:pPr marL="456915" lvl="0" indent="-456915" defTabSz="1218438">
+              <a:t>Чертаене на фигури</a:t>
+            </a:r>
+          </a:p>
+          <a:p>
+            <a:pPr marL="914115" lvl="1" indent="-456915" defTabSz="1218438">
               <a:lnSpc>
                 <a:spcPct val="105000"/>
               </a:lnSpc>
@@ -16008,30 +16318,63 @@
               <a:buFont typeface="Wingdings" panose="05000000000000000000" pitchFamily="2" charset="2"/>
               <a:buChar char="§"/>
             </a:pPr>
-            <a:endParaRPr lang="bg-BG" sz="2900" b="1" dirty="0">
-              <a:solidFill>
-                <a:schemeClr val="bg2"/>
-              </a:solidFill>
-            </a:endParaRPr>
-          </a:p>
-          <a:p>
-            <a:pPr marL="456915" lvl="0" indent="-456915" defTabSz="1218438">
-              <a:lnSpc>
-                <a:spcPct val="105000"/>
-              </a:lnSpc>
-              <a:spcBef>
-                <a:spcPts val="600"/>
-              </a:spcBef>
-              <a:spcAft>
-                <a:spcPts val="600"/>
-              </a:spcAft>
-              <a:buClr>
-                <a:schemeClr val="bg2"/>
-              </a:buClr>
-              <a:buFont typeface="Wingdings" panose="05000000000000000000" pitchFamily="2" charset="2"/>
-              <a:buChar char="§"/>
-            </a:pPr>
-            <a:endParaRPr lang="bg-BG" sz="2900" b="1" dirty="0">
+            <a:r>
+              <a:rPr lang="bg-BG" sz="3400" dirty="0">
+                <a:solidFill>
+                  <a:schemeClr val="bg2"/>
+                </a:solidFill>
+              </a:rPr>
+              <a:t>360/</a:t>
+            </a:r>
+            <a:r>
+              <a:rPr lang="en-US" sz="3400" dirty="0">
+                <a:solidFill>
+                  <a:schemeClr val="bg2"/>
+                </a:solidFill>
+              </a:rPr>
+              <a:t>n° (n </a:t>
+            </a:r>
+            <a:r>
+              <a:rPr lang="bg-BG" sz="3400" dirty="0">
+                <a:solidFill>
+                  <a:schemeClr val="bg2"/>
+                </a:solidFill>
+              </a:rPr>
+              <a:t>пъти)</a:t>
+            </a:r>
+            <a:r>
+              <a:rPr lang="en-US" sz="3400" dirty="0">
+                <a:solidFill>
+                  <a:schemeClr val="bg2"/>
+                </a:solidFill>
+              </a:rPr>
+              <a:t> </a:t>
+            </a:r>
+            <a:r>
+              <a:rPr lang="bg-BG" sz="3400" dirty="0">
+                <a:solidFill>
+                  <a:schemeClr val="bg2"/>
+                </a:solidFill>
+              </a:rPr>
+              <a:t>за създаване на </a:t>
+            </a:r>
+            <a:r>
+              <a:rPr lang="en-US" sz="3400" dirty="0">
+                <a:solidFill>
+                  <a:schemeClr val="bg2"/>
+                </a:solidFill>
+              </a:rPr>
+              <a:t>n-</a:t>
+            </a:r>
+            <a:r>
+              <a:rPr lang="bg-BG" sz="3400" dirty="0">
+                <a:solidFill>
+                  <a:schemeClr val="bg2"/>
+                </a:solidFill>
+              </a:rPr>
+              <a:t>ъгълник</a:t>
+            </a:r>
+            <a:endParaRPr lang="en-US" sz="3400" dirty="0">
               <a:solidFill>
                 <a:schemeClr val="bg2"/>
               </a:solidFill>
@@ -16143,6 +16486,37 @@
                                           <p:spTgt spid="3">
                                             <p:txEl>
                                               <p:pRg st="2" end="2"/>
+                                            </p:txEl>
+                                          </p:spTgt>
+                                        </p:tgtEl>
+                                        <p:attrNameLst>
+                                          <p:attrName>style.visibility</p:attrName>
+                                        </p:attrNameLst>
+                                      </p:cBhvr>
+                                      <p:to>
+                                        <p:strVal val="visible"/>
+                                      </p:to>
+                                    </p:set>
+                                  </p:childTnLst>
+                                </p:cTn>
+                              </p:par>
+                              <p:par>
+                                <p:cTn id="11" presetID="1" presetClass="entr" presetSubtype="0" fill="hold" nodeType="withEffect">
+                                  <p:stCondLst>
+                                    <p:cond delay="0"/>
+                                  </p:stCondLst>
+                                  <p:childTnLst>
+                                    <p:set>
+                                      <p:cBhvr>
+                                        <p:cTn id="12" dur="1" fill="hold">
+                                          <p:stCondLst>
+                                            <p:cond delay="0"/>
+                                          </p:stCondLst>
+                                        </p:cTn>
+                                        <p:tgtEl>
+                                          <p:spTgt spid="3">
+                                            <p:txEl>
+                                              <p:pRg st="3" end="3"/>
                                             </p:txEl>
                                           </p:spTgt>
                                         </p:tgtEl>
@@ -17012,16 +17386,12 @@
               </a:buClr>
             </a:pPr>
             <a:r>
-              <a:rPr lang="bg-BG" sz="3000" dirty="0" smtClean="0"/>
+              <a:rPr lang="bg-BG" sz="3000" dirty="0"/>
               <a:t>Разширява </a:t>
             </a:r>
             <a:r>
-              <a:rPr lang="ru-RU" sz="3000" dirty="0" smtClean="0"/>
-              <a:t>обхвата </a:t>
-            </a:r>
-            <a:r>
               <a:rPr lang="ru-RU" sz="3000" dirty="0"/>
-              <a:t>на </a:t>
+              <a:t>обхвата на </a:t>
             </a:r>
             <a:r>
               <a:rPr lang="ru-RU" sz="3000" b="1" dirty="0"/>
@@ -17206,7 +17576,7 @@
                                         <p:tgtEl>
                                           <p:spTgt spid="6">
                                             <p:txEl>
-                                              <p:pRg st="2" end="2"/>
+                                              <p:pRg st="1" end="1"/>
                                             </p:txEl>
                                           </p:spTgt>
                                         </p:tgtEl>
@@ -17248,6 +17618,55 @@
                                     <p:set>
                                       <p:cBhvr>
                                         <p:cTn id="10" dur="1" fill="hold">
+                                          <p:stCondLst>
+                                            <p:cond delay="0"/>
+                                          </p:stCondLst>
+                                        </p:cTn>
+                                        <p:tgtEl>
+                                          <p:spTgt spid="6">
+                                            <p:txEl>
+                                              <p:pRg st="2" end="2"/>
+                                            </p:txEl>
+                                          </p:spTgt>
+                                        </p:tgtEl>
+                                        <p:attrNameLst>
+                                          <p:attrName>style.visibility</p:attrName>
+                                        </p:attrNameLst>
+                                      </p:cBhvr>
+                                      <p:to>
+                                        <p:strVal val="visible"/>
+                                      </p:to>
+                                    </p:set>
+                                  </p:childTnLst>
+                                </p:cTn>
+                              </p:par>
+                            </p:childTnLst>
+                          </p:cTn>
+                        </p:par>
+                      </p:childTnLst>
+                    </p:cTn>
+                  </p:par>
+                  <p:par>
+                    <p:cTn id="11" fill="hold">
+                      <p:stCondLst>
+                        <p:cond delay="indefinite"/>
+                      </p:stCondLst>
+                      <p:childTnLst>
+                        <p:par>
+                          <p:cTn id="12" fill="hold">
+                            <p:stCondLst>
+                              <p:cond delay="0"/>
+                            </p:stCondLst>
+                            <p:childTnLst>
+                              <p:par>
+                                <p:cTn id="13" presetID="1" presetClass="entr" presetSubtype="0" fill="hold" nodeType="clickEffect">
+                                  <p:stCondLst>
+                                    <p:cond delay="0"/>
+                                  </p:stCondLst>
+                                  <p:childTnLst>
+                                    <p:set>
+                                      <p:cBhvr>
+                                        <p:cTn id="14" dur="1" fill="hold">
                                           <p:stCondLst>
                                             <p:cond delay="0"/>
                                           </p:stCondLst>
@@ -17435,8 +17854,8 @@
         </p:blipFill>
         <p:spPr>
           <a:xfrm>
-            <a:off x="1102448" y="1296359"/>
-            <a:ext cx="9987105" cy="5409682"/>
+            <a:off x="766301" y="1111215"/>
+            <a:ext cx="10585322" cy="5733722"/>
           </a:xfrm>
           <a:prstGeom prst="rect">
             <a:avLst/>
@@ -17794,7 +18213,7 @@
         </p:nvSpPr>
         <p:spPr bwMode="auto">
           <a:xfrm>
-            <a:off x="3101871" y="4559439"/>
+            <a:off x="2688201" y="4768444"/>
             <a:ext cx="4510454" cy="1116623"/>
           </a:xfrm>
           <a:prstGeom prst="wedgeRoundRectCallout">
@@ -18014,8 +18433,8 @@
         </p:blipFill>
         <p:spPr>
           <a:xfrm>
-            <a:off x="1102448" y="1296360"/>
-            <a:ext cx="9987105" cy="5409682"/>
+            <a:off x="790470" y="1110343"/>
+            <a:ext cx="10611059" cy="5747657"/>
           </a:xfrm>
           <a:prstGeom prst="rect">
             <a:avLst/>
@@ -18084,8 +18503,8 @@
         </p:nvSpPr>
         <p:spPr bwMode="auto">
           <a:xfrm>
-            <a:off x="5122811" y="4150789"/>
-            <a:ext cx="3965331" cy="975946"/>
+            <a:off x="4574171" y="4333669"/>
+            <a:ext cx="3965331" cy="1113542"/>
           </a:xfrm>
           <a:prstGeom prst="wedgeRoundRectCallout">
             <a:avLst>
@@ -18297,8 +18716,8 @@
         </p:blipFill>
         <p:spPr>
           <a:xfrm>
-            <a:off x="1102448" y="1296360"/>
-            <a:ext cx="9987105" cy="5409682"/>
+            <a:off x="785423" y="1104875"/>
+            <a:ext cx="10621153" cy="5753125"/>
           </a:xfrm>
           <a:prstGeom prst="rect">
             <a:avLst/>
@@ -18367,7 +18786,7 @@
         </p:nvSpPr>
         <p:spPr bwMode="auto">
           <a:xfrm>
-            <a:off x="4035669" y="3613637"/>
+            <a:off x="3565406" y="3822643"/>
             <a:ext cx="4273062" cy="1468315"/>
           </a:xfrm>
           <a:prstGeom prst="wedgeRoundRectCallout">
@@ -18694,13 +19113,6 @@
       <p:transition spd="slow" advClick="0" advTm="5000"/>
     </mc:Fallback>
   </mc:AlternateContent>
-  <p:timing>
-    <p:tnLst>
-      <p:par>
-        <p:cTn id="1" dur="indefinite" restart="never" nodeType="tmRoot"/>
-      </p:par>
-    </p:tnLst>
-  </p:timing>
 </p:sld>
 </file>
 

</xml_diff>

<commit_message>
Updates on Paint exam and Scratch slides
</commit_message>
<xml_diff>
--- a/Courses/Computer-Modeling-and-IT/Computer-Modeling-and-IT-5-Class/18-Drawing-Figures/18-Drawing-Figures.pptx
+++ b/Courses/Computer-Modeling-and-IT/Computer-Modeling-and-IT-5-Class/18-Drawing-Figures/18-Drawing-Figures.pptx
@@ -579,7 +579,7 @@
           <a:p>
             <a:fld id="{4E087215-0C8F-4762-A664-737A353EC9A4}" type="datetimeFigureOut">
               <a:rPr lang="bg-BG" smtClean="0"/>
-              <a:t>13.01.24 г.</a:t>
+              <a:t>17.01.24 г.</a:t>
             </a:fld>
             <a:endParaRPr lang="bg-BG"/>
           </a:p>
@@ -756,7 +756,7 @@
           <a:p>
             <a:fld id="{72D84649-876A-46C9-8472-14CB09C070D8}" type="datetimeFigureOut">
               <a:rPr lang="en-US" smtClean="0"/>
-              <a:t>1/13/24</a:t>
+              <a:t>1/17/24</a:t>
             </a:fld>
             <a:endParaRPr lang="en-US"/>
           </a:p>
@@ -3026,7 +3026,7 @@
             <a:fld id="{055373AC-9AA7-423B-BA00-BA1C74164DBD}" type="datetime1">
               <a:rPr lang="en-US" smtClean="0"/>
               <a:pPr/>
-              <a:t>1/13/24</a:t>
+              <a:t>1/17/24</a:t>
             </a:fld>
             <a:endParaRPr lang="en-US" dirty="0"/>
           </a:p>
@@ -3705,7 +3705,7 @@
             <a:fld id="{055373AC-9AA7-423B-BA00-BA1C74164DBD}" type="datetime1">
               <a:rPr lang="en-US" smtClean="0"/>
               <a:pPr/>
-              <a:t>1/13/24</a:t>
+              <a:t>1/17/24</a:t>
             </a:fld>
             <a:endParaRPr lang="en-US" dirty="0"/>
           </a:p>
@@ -4464,7 +4464,7 @@
             <a:fld id="{055373AC-9AA7-423B-BA00-BA1C74164DBD}" type="datetime1">
               <a:rPr lang="en-US" smtClean="0"/>
               <a:pPr/>
-              <a:t>1/13/24</a:t>
+              <a:t>1/17/24</a:t>
             </a:fld>
             <a:endParaRPr lang="en-US" dirty="0"/>
           </a:p>
@@ -4959,7 +4959,7 @@
             <a:fld id="{055373AC-9AA7-423B-BA00-BA1C74164DBD}" type="datetime1">
               <a:rPr lang="en-US" smtClean="0"/>
               <a:pPr/>
-              <a:t>1/13/24</a:t>
+              <a:t>1/17/24</a:t>
             </a:fld>
             <a:endParaRPr lang="en-US" dirty="0"/>
           </a:p>
@@ -7069,7 +7069,7 @@
             <a:fld id="{055373AC-9AA7-423B-BA00-BA1C74164DBD}" type="datetime1">
               <a:rPr lang="en-US" smtClean="0"/>
               <a:pPr/>
-              <a:t>1/13/24</a:t>
+              <a:t>1/17/24</a:t>
             </a:fld>
             <a:endParaRPr lang="en-US" dirty="0"/>
           </a:p>
@@ -8408,7 +8408,7 @@
             <a:fld id="{055373AC-9AA7-423B-BA00-BA1C74164DBD}" type="datetime1">
               <a:rPr lang="en-US" smtClean="0"/>
               <a:pPr/>
-              <a:t>1/13/24</a:t>
+              <a:t>1/17/24</a:t>
             </a:fld>
             <a:endParaRPr lang="en-US" dirty="0"/>
           </a:p>
@@ -9488,7 +9488,7 @@
             <a:fld id="{055373AC-9AA7-423B-BA00-BA1C74164DBD}" type="datetime1">
               <a:rPr lang="en-US" smtClean="0"/>
               <a:pPr/>
-              <a:t>1/13/24</a:t>
+              <a:t>1/17/24</a:t>
             </a:fld>
             <a:endParaRPr lang="en-US" dirty="0"/>
           </a:p>
@@ -9900,7 +9900,7 @@
             <a:fld id="{055373AC-9AA7-423B-BA00-BA1C74164DBD}" type="datetime1">
               <a:rPr lang="en-US" smtClean="0"/>
               <a:pPr/>
-              <a:t>1/13/24</a:t>
+              <a:t>1/17/24</a:t>
             </a:fld>
             <a:endParaRPr lang="en-US" dirty="0"/>
           </a:p>
@@ -10270,7 +10270,7 @@
             <a:fld id="{055373AC-9AA7-423B-BA00-BA1C74164DBD}" type="datetime1">
               <a:rPr lang="en-US" smtClean="0"/>
               <a:pPr/>
-              <a:t>1/13/24</a:t>
+              <a:t>1/17/24</a:t>
             </a:fld>
             <a:endParaRPr lang="en-US" dirty="0"/>
           </a:p>
@@ -10938,7 +10938,7 @@
             <a:fld id="{055373AC-9AA7-423B-BA00-BA1C74164DBD}" type="datetime1">
               <a:rPr lang="en-US" smtClean="0"/>
               <a:pPr/>
-              <a:t>1/13/24</a:t>
+              <a:t>1/17/24</a:t>
             </a:fld>
             <a:endParaRPr lang="en-US" dirty="0"/>
           </a:p>
@@ -11146,7 +11146,7 @@
             <a:fld id="{055373AC-9AA7-423B-BA00-BA1C74164DBD}" type="datetime1">
               <a:rPr lang="en-US" smtClean="0"/>
               <a:pPr/>
-              <a:t>1/13/24</a:t>
+              <a:t>1/17/24</a:t>
             </a:fld>
             <a:endParaRPr lang="en-US" dirty="0"/>
           </a:p>
@@ -17847,15 +17847,20 @@
           <p:nvPr/>
         </p:nvPicPr>
         <p:blipFill>
-          <a:blip r:embed="rId3"/>
-          <a:stretch>
-            <a:fillRect/>
-          </a:stretch>
+          <a:blip r:embed="rId3">
+            <a:extLst>
+              <a:ext uri="{28A0092B-C50C-407E-A947-70E740481C1C}">
+                <a14:useLocalDpi xmlns:a14="http://schemas.microsoft.com/office/drawing/2010/main" val="0"/>
+              </a:ext>
+            </a:extLst>
+          </a:blip>
+          <a:srcRect/>
+          <a:stretch/>
         </p:blipFill>
         <p:spPr>
           <a:xfrm>
-            <a:off x="766301" y="1111215"/>
-            <a:ext cx="10585322" cy="5733722"/>
+            <a:off x="1819145" y="1246254"/>
+            <a:ext cx="8553709" cy="5449223"/>
           </a:xfrm>
           <a:prstGeom prst="rect">
             <a:avLst/>
@@ -18213,7 +18218,7 @@
         </p:nvSpPr>
         <p:spPr bwMode="auto">
           <a:xfrm>
-            <a:off x="2688201" y="4768444"/>
+            <a:off x="3718214" y="4610789"/>
             <a:ext cx="4510454" cy="1116623"/>
           </a:xfrm>
           <a:prstGeom prst="wedgeRoundRectCallout">
@@ -18426,15 +18431,20 @@
           <p:nvPr/>
         </p:nvPicPr>
         <p:blipFill>
-          <a:blip r:embed="rId2"/>
-          <a:stretch>
-            <a:fillRect/>
-          </a:stretch>
+          <a:blip r:embed="rId2">
+            <a:extLst>
+              <a:ext uri="{28A0092B-C50C-407E-A947-70E740481C1C}">
+                <a14:useLocalDpi xmlns:a14="http://schemas.microsoft.com/office/drawing/2010/main" val="0"/>
+              </a:ext>
+            </a:extLst>
+          </a:blip>
+          <a:srcRect/>
+          <a:stretch/>
         </p:blipFill>
         <p:spPr>
           <a:xfrm>
-            <a:off x="790470" y="1110343"/>
-            <a:ext cx="10611059" cy="5747657"/>
+            <a:off x="1865300" y="1198179"/>
+            <a:ext cx="8461400" cy="5430095"/>
           </a:xfrm>
           <a:prstGeom prst="rect">
             <a:avLst/>
@@ -18503,7 +18513,7 @@
         </p:nvSpPr>
         <p:spPr bwMode="auto">
           <a:xfrm>
-            <a:off x="4574171" y="4333669"/>
+            <a:off x="4998560" y="4039379"/>
             <a:ext cx="3965331" cy="1113542"/>
           </a:xfrm>
           <a:prstGeom prst="wedgeRoundRectCallout">
@@ -18709,15 +18719,20 @@
           <p:nvPr/>
         </p:nvPicPr>
         <p:blipFill>
-          <a:blip r:embed="rId2"/>
-          <a:stretch>
-            <a:fillRect/>
-          </a:stretch>
+          <a:blip r:embed="rId2">
+            <a:extLst>
+              <a:ext uri="{28A0092B-C50C-407E-A947-70E740481C1C}">
+                <a14:useLocalDpi xmlns:a14="http://schemas.microsoft.com/office/drawing/2010/main" val="0"/>
+              </a:ext>
+            </a:extLst>
+          </a:blip>
+          <a:srcRect/>
+          <a:stretch/>
         </p:blipFill>
         <p:spPr>
           <a:xfrm>
-            <a:off x="785423" y="1104875"/>
-            <a:ext cx="10621153" cy="5753125"/>
+            <a:off x="1859630" y="1178448"/>
+            <a:ext cx="8472739" cy="5453580"/>
           </a:xfrm>
           <a:prstGeom prst="rect">
             <a:avLst/>
@@ -18786,7 +18801,7 @@
         </p:nvSpPr>
         <p:spPr bwMode="auto">
           <a:xfrm>
-            <a:off x="3565406" y="3822643"/>
+            <a:off x="4658482" y="4085402"/>
             <a:ext cx="4273062" cy="1468315"/>
           </a:xfrm>
           <a:prstGeom prst="wedgeRoundRectCallout">

</xml_diff>